<commit_message>
A little funny thing
I need to split css files for user and admin because they are conjoined somewhere and what i do to user is transalting to admin.
</commit_message>
<xml_diff>
--- a/UnusedCode/Navigations.pptx
+++ b/UnusedCode/Navigations.pptx
@@ -5081,6 +5081,36 @@
           <a:chExt cx="0" cy="0"/>
         </a:xfrm>
       </p:grpSpPr>
+      <p:pic>
+        <p:nvPicPr>
+          <p:cNvPr id="2" name="Picture 1">
+            <a:extLst>
+              <a:ext uri="{FF2B5EF4-FFF2-40B4-BE49-F238E27FC236}">
+                <a16:creationId xmlns:a16="http://schemas.microsoft.com/office/drawing/2014/main" id="{5C9E128E-721B-49D7-9CD0-6AD64C306ED2}"/>
+              </a:ext>
+            </a:extLst>
+          </p:cNvPr>
+          <p:cNvPicPr>
+            <a:picLocks noChangeAspect="1"/>
+          </p:cNvPicPr>
+          <p:nvPr/>
+        </p:nvPicPr>
+        <p:blipFill>
+          <a:blip r:embed="rId2"/>
+          <a:stretch>
+            <a:fillRect/>
+          </a:stretch>
+        </p:blipFill>
+        <p:spPr>
+          <a:xfrm>
+            <a:off x="0" y="127000"/>
+            <a:ext cx="12192000" cy="6604000"/>
+          </a:xfrm>
+          <a:prstGeom prst="rect">
+            <a:avLst/>
+          </a:prstGeom>
+        </p:spPr>
+      </p:pic>
     </p:spTree>
     <p:extLst>
       <p:ext uri="{BB962C8B-B14F-4D97-AF65-F5344CB8AC3E}">
@@ -5111,6 +5141,35 @@
           <a:chExt cx="0" cy="0"/>
         </a:xfrm>
       </p:grpSpPr>
+      <p:pic>
+        <p:nvPicPr>
+          <p:cNvPr id="2" name="Picture 1">
+            <a:extLst>
+              <a:ext uri="{FF2B5EF4-FFF2-40B4-BE49-F238E27FC236}">
+                <a16:creationId xmlns:a16="http://schemas.microsoft.com/office/drawing/2014/main" id="{70EFBCC7-C53F-4896-A39E-51C07BD1EA5F}"/>
+              </a:ext>
+            </a:extLst>
+          </p:cNvPr>
+          <p:cNvPicPr>
+            <a:picLocks noChangeAspect="1"/>
+          </p:cNvPicPr>
+          <p:nvPr/>
+        </p:nvPicPr>
+        <p:blipFill rotWithShape="1">
+          <a:blip r:embed="rId2"/>
+          <a:srcRect b="2041"/>
+          <a:stretch/>
+        </p:blipFill>
+        <p:spPr>
+          <a:xfrm>
+            <a:off x="4618039" y="0"/>
+            <a:ext cx="2955922" cy="6718041"/>
+          </a:xfrm>
+          <a:prstGeom prst="rect">
+            <a:avLst/>
+          </a:prstGeom>
+        </p:spPr>
+      </p:pic>
     </p:spTree>
     <p:extLst>
       <p:ext uri="{BB962C8B-B14F-4D97-AF65-F5344CB8AC3E}">

</xml_diff>